<commit_message>
Deployed 2fe239f with MkDocs version: 1.2.3
</commit_message>
<xml_diff>
--- a/week-4/ce100-week-4-heap.md_word.pptx
+++ b/week-4/ce100-week-4-heap.md_word.pptx
@@ -44,6 +44,8 @@
     <p:sldId id="292" r:id="rId38"/>
     <p:sldId id="293" r:id="rId39"/>
     <p:sldId id="294" r:id="rId40"/>
+    <p:sldId id="295" r:id="rId41"/>
+    <p:sldId id="296" r:id="rId42"/>
   </p:sldIdLst>
   <p:sldSz cx="9144000" cy="6858000" type="screen4x3"/>
   <p:notesSz cx="6858000" cy="9144000"/>
@@ -10869,7 +10871,12 @@
             <p:ph type="title"/>
           </p:nvPr>
         </p:nvSpPr>
-        <p:spPr/>
+        <p:spPr>
+          <a:xfrm>
+            <a:off x="457200" y="273050"/>
+            <a:ext cx="3008313" cy="1162050"/>
+          </a:xfrm>
+        </p:spPr>
         <p:txBody>
           <a:bodyPr/>
           <a:lstStyle/>
@@ -10888,12 +10895,12 @@
         <mc:Choice xmlns:a14="http://schemas.microsoft.com/office/drawing/2010/main" Requires="a14">
           <p:sp>
             <p:nvSpPr>
-              <p:cNvPr id="3" name="Content Placeholder 2"/>
+              <p:cNvPr id="4" name="Text Placeholder 3"/>
               <p:cNvSpPr>
                 <a:spLocks noGrp="1"/>
               </p:cNvSpPr>
               <p:nvPr>
-                <p:ph idx="1"/>
+                <p:ph idx="2" sz="half" type="body"/>
               </p:nvPr>
             </p:nvSpPr>
             <p:spPr/>
@@ -10943,13 +10950,73 @@
                 </a14:m>
                 <a:r>
                   <a:rPr/>
-                  <a:t> nodes of a heap are all leaves. alt:“alt” height:450px center</a:t>
+                  <a:t> nodes of a heap are all leaves.</a:t>
                 </a:r>
               </a:p>
             </p:txBody>
           </p:sp>
         </mc:Choice>
       </mc:AlternateContent>
+      <p:pic>
+        <p:nvPicPr>
+          <p:cNvPr descr="fig:  assets/ce100-week-4-heap-heap_heap_leaves.drawio.svg" id="0" name="Picture 1"/>
+          <p:cNvPicPr>
+            <a:picLocks noGrp="1" noChangeAspect="1"/>
+          </p:cNvPicPr>
+          <p:nvPr/>
+        </p:nvPicPr>
+        <p:blipFill>
+          <a:blip r:embed="rId2"/>
+          <a:stretch>
+            <a:fillRect/>
+          </a:stretch>
+        </p:blipFill>
+        <p:spPr bwMode="auto">
+          <a:xfrm>
+            <a:off x="3568700" y="1574800"/>
+            <a:ext cx="5105400" cy="2705100"/>
+          </a:xfrm>
+          <a:prstGeom prst="rect">
+            <a:avLst/>
+          </a:prstGeom>
+          <a:noFill/>
+          <a:ln w="9525">
+            <a:noFill/>
+            <a:headEnd/>
+            <a:tailEnd/>
+          </a:ln>
+        </p:spPr>
+      </p:pic>
+      <p:sp>
+        <p:nvSpPr>
+          <p:cNvPr id="1" name="TextBox 3"/>
+          <p:cNvSpPr txBox="1"/>
+          <p:nvPr/>
+        </p:nvSpPr>
+        <p:spPr>
+          <a:xfrm>
+            <a:off x="3568700" y="5600700"/>
+            <a:ext cx="5105400" cy="508000"/>
+          </a:xfrm>
+          <a:prstGeom prst="rect">
+            <a:avLst/>
+          </a:prstGeom>
+          <a:noFill/>
+        </p:spPr>
+        <p:txBody>
+          <a:bodyPr/>
+          <a:lstStyle/>
+          <a:p>
+            <a:pPr lvl="0" indent="0" marL="0" algn="ctr">
+              <a:buNone/>
+            </a:pPr>
+            <a:r>
+              <a:rPr/>
+              <a:t>bg right w:600</a:t>
+            </a:r>
+          </a:p>
+        </p:txBody>
+      </p:sp>
     </p:spTree>
   </p:cSld>
 </p:sld>
@@ -10972,106 +11039,62 @@
           <a:chExt cx="0" cy="0"/>
         </a:xfrm>
       </p:grpSpPr>
-      <p:sp>
-        <p:nvSpPr>
-          <p:cNvPr id="2" name="Title 1"/>
-          <p:cNvSpPr>
-            <a:spLocks noGrp="1"/>
-          </p:cNvSpPr>
-          <p:nvPr>
-            <p:ph type="title"/>
-          </p:nvPr>
-        </p:nvSpPr>
-        <p:spPr/>
+      <p:pic>
+        <p:nvPicPr>
+          <p:cNvPr descr="fig:  assets/ce100-week-4-heap-heap_stored_leaves_lemma.drawio.svg" id="0" name="Picture 1"/>
+          <p:cNvPicPr>
+            <a:picLocks noGrp="1" noChangeAspect="1"/>
+          </p:cNvPicPr>
+          <p:nvPr/>
+        </p:nvPicPr>
+        <p:blipFill>
+          <a:blip r:embed="rId2"/>
+          <a:stretch>
+            <a:fillRect/>
+          </a:stretch>
+        </p:blipFill>
+        <p:spPr bwMode="auto">
+          <a:xfrm>
+            <a:off x="2311400" y="1600200"/>
+            <a:ext cx="4533900" cy="4013200"/>
+          </a:xfrm>
+          <a:prstGeom prst="rect">
+            <a:avLst/>
+          </a:prstGeom>
+          <a:noFill/>
+          <a:ln w="9525">
+            <a:noFill/>
+            <a:headEnd/>
+            <a:tailEnd/>
+          </a:ln>
+        </p:spPr>
+      </p:pic>
+      <p:sp>
+        <p:nvSpPr>
+          <p:cNvPr id="1" name="TextBox 3"/>
+          <p:cNvSpPr txBox="1"/>
+          <p:nvPr/>
+        </p:nvSpPr>
+        <p:spPr>
+          <a:xfrm>
+            <a:off x="457200" y="5613400"/>
+            <a:ext cx="8229600" cy="508000"/>
+          </a:xfrm>
+          <a:prstGeom prst="rect">
+            <a:avLst/>
+          </a:prstGeom>
+          <a:noFill/>
+        </p:spPr>
         <p:txBody>
           <a:bodyPr/>
           <a:lstStyle/>
           <a:p>
-            <a:pPr lvl="0" indent="0" marL="0">
+            <a:pPr lvl="0" indent="0" marL="0" algn="ctr">
               <a:buNone/>
             </a:pPr>
             <a:r>
               <a:rPr/>
-              <a:t>References</a:t>
-            </a:r>
-          </a:p>
-        </p:txBody>
-      </p:sp>
-      <p:sp>
-        <p:nvSpPr>
-          <p:cNvPr id="3" name="Content Placeholder 2"/>
-          <p:cNvSpPr>
-            <a:spLocks noGrp="1"/>
-          </p:cNvSpPr>
-          <p:nvPr>
-            <p:ph idx="1"/>
-          </p:nvPr>
-        </p:nvSpPr>
-        <p:spPr/>
-        <p:txBody>
-          <a:bodyPr/>
-          <a:lstStyle/>
-          <a:p>
-            <a:pPr lvl="0"/>
-            <a:r>
-              <a:rPr>
-                <a:hlinkClick r:id="rId2"/>
-              </a:rPr>
-              <a:t>Introduction to Algorithms, Third Edition | The MIT Press</a:t>
-            </a:r>
-          </a:p>
-          <a:p>
-            <a:pPr lvl="0"/>
-            <a:r>
-              <a:rPr>
-                <a:hlinkClick r:id="rId3"/>
-              </a:rPr>
-              <a:t>Bilkent CS473 Course Notes (new)</a:t>
-            </a:r>
-          </a:p>
-          <a:p>
-            <a:pPr lvl="0"/>
-            <a:r>
-              <a:rPr>
-                <a:hlinkClick r:id="rId4"/>
-              </a:rPr>
-              <a:t>Bilkent CS473 Course Notes (old)</a:t>
-            </a:r>
-          </a:p>
-          <a:p>
-            <a:pPr lvl="0"/>
-            <a:r>
-              <a:rPr>
-                <a:hlinkClick r:id="rId5"/>
-              </a:rPr>
-              <a:t>Insertion Sort - GeeksforGeeks</a:t>
-            </a:r>
-          </a:p>
-          <a:p>
-            <a:pPr lvl="0"/>
-            <a:r>
-              <a:rPr>
-                <a:hlinkClick r:id="rId6"/>
-              </a:rPr>
-              <a:t>NIST Dictionary of Algorithms and Data Structures</a:t>
-            </a:r>
-          </a:p>
-          <a:p>
-            <a:pPr lvl="0"/>
-            <a:r>
-              <a:rPr>
-                <a:hlinkClick r:id="rId7"/>
-              </a:rPr>
-              <a:t>NIST - Dictionary of Algorithms and Data Structures</a:t>
-            </a:r>
-          </a:p>
-          <a:p>
-            <a:pPr lvl="0" indent="0" marL="0">
-              <a:buNone/>
-            </a:pPr>
-            <a:r>
-              <a:rPr/>
-              <a:t>TODO</a:t>
+              <a:t>bg right w:600</a:t>
             </a:r>
           </a:p>
         </p:txBody>
@@ -11119,6 +11142,191 @@
             <a:r>
               <a:rPr/>
               <a:t>Heap/Heap Sort</a:t>
+            </a:r>
+          </a:p>
+        </p:txBody>
+      </p:sp>
+    </p:spTree>
+  </p:cSld>
+</p:sld>
+</file>
+
+<file path=ppt/slides/slide40.xml><?xml version="1.0" encoding="utf-8"?>
+<p:sld xmlns:a="http://schemas.openxmlformats.org/drawingml/2006/main" xmlns:r="http://schemas.openxmlformats.org/officeDocument/2006/relationships" xmlns:p="http://schemas.openxmlformats.org/presentationml/2006/main">
+  <p:cSld>
+    <p:spTree>
+      <p:nvGrpSpPr>
+        <p:cNvPr id="1" name=""/>
+        <p:cNvGrpSpPr/>
+        <p:nvPr/>
+      </p:nvGrpSpPr>
+      <p:grpSpPr>
+        <a:xfrm>
+          <a:off x="0" y="0"/>
+          <a:ext cx="0" cy="0"/>
+          <a:chOff x="0" y="0"/>
+          <a:chExt cx="0" cy="0"/>
+        </a:xfrm>
+      </p:grpSpPr>
+      <p:sp>
+        <p:nvSpPr>
+          <p:cNvPr id="3" name="Content Placeholder 2"/>
+          <p:cNvSpPr>
+            <a:spLocks noGrp="1"/>
+          </p:cNvSpPr>
+          <p:nvPr>
+            <p:ph idx="1"/>
+          </p:nvPr>
+        </p:nvSpPr>
+        <p:spPr/>
+        <p:txBody>
+          <a:bodyPr/>
+          <a:lstStyle/>
+          <a:p>
+            <a:pPr lvl="0"/>
+            <a:r>
+              <a:rPr/>
+              <a:t>asdasdsdas</a:t>
+            </a:r>
+          </a:p>
+          <a:p>
+            <a:pPr lvl="0"/>
+            <a:r>
+              <a:rPr/>
+              <a:t>asdsadsa</a:t>
+            </a:r>
+          </a:p>
+          <a:p>
+            <a:pPr lvl="0"/>
+            <a:r>
+              <a:rPr/>
+              <a:t>asdas</a:t>
+            </a:r>
+          </a:p>
+        </p:txBody>
+      </p:sp>
+    </p:spTree>
+  </p:cSld>
+</p:sld>
+</file>
+
+<file path=ppt/slides/slide41.xml><?xml version="1.0" encoding="utf-8"?>
+<p:sld xmlns:a="http://schemas.openxmlformats.org/drawingml/2006/main" xmlns:r="http://schemas.openxmlformats.org/officeDocument/2006/relationships" xmlns:p="http://schemas.openxmlformats.org/presentationml/2006/main">
+  <p:cSld>
+    <p:spTree>
+      <p:nvGrpSpPr>
+        <p:cNvPr id="1" name=""/>
+        <p:cNvGrpSpPr/>
+        <p:nvPr/>
+      </p:nvGrpSpPr>
+      <p:grpSpPr>
+        <a:xfrm>
+          <a:off x="0" y="0"/>
+          <a:ext cx="0" cy="0"/>
+          <a:chOff x="0" y="0"/>
+          <a:chExt cx="0" cy="0"/>
+        </a:xfrm>
+      </p:grpSpPr>
+      <p:sp>
+        <p:nvSpPr>
+          <p:cNvPr id="2" name="Title 1"/>
+          <p:cNvSpPr>
+            <a:spLocks noGrp="1"/>
+          </p:cNvSpPr>
+          <p:nvPr>
+            <p:ph type="title"/>
+          </p:nvPr>
+        </p:nvSpPr>
+        <p:spPr/>
+        <p:txBody>
+          <a:bodyPr/>
+          <a:lstStyle/>
+          <a:p>
+            <a:pPr lvl="0" indent="0" marL="0">
+              <a:buNone/>
+            </a:pPr>
+            <a:r>
+              <a:rPr/>
+              <a:t>References</a:t>
+            </a:r>
+          </a:p>
+        </p:txBody>
+      </p:sp>
+      <p:sp>
+        <p:nvSpPr>
+          <p:cNvPr id="3" name="Content Placeholder 2"/>
+          <p:cNvSpPr>
+            <a:spLocks noGrp="1"/>
+          </p:cNvSpPr>
+          <p:nvPr>
+            <p:ph idx="1"/>
+          </p:nvPr>
+        </p:nvSpPr>
+        <p:spPr/>
+        <p:txBody>
+          <a:bodyPr/>
+          <a:lstStyle/>
+          <a:p>
+            <a:pPr lvl="0"/>
+            <a:r>
+              <a:rPr>
+                <a:hlinkClick r:id="rId2"/>
+              </a:rPr>
+              <a:t>Introduction to Algorithms, Third Edition | The MIT Press</a:t>
+            </a:r>
+          </a:p>
+          <a:p>
+            <a:pPr lvl="0"/>
+            <a:r>
+              <a:rPr>
+                <a:hlinkClick r:id="rId3"/>
+              </a:rPr>
+              <a:t>Bilkent CS473 Course Notes (new)</a:t>
+            </a:r>
+          </a:p>
+          <a:p>
+            <a:pPr lvl="0"/>
+            <a:r>
+              <a:rPr>
+                <a:hlinkClick r:id="rId4"/>
+              </a:rPr>
+              <a:t>Bilkent CS473 Course Notes (old)</a:t>
+            </a:r>
+          </a:p>
+          <a:p>
+            <a:pPr lvl="0"/>
+            <a:r>
+              <a:rPr>
+                <a:hlinkClick r:id="rId5"/>
+              </a:rPr>
+              <a:t>Insertion Sort - GeeksforGeeks</a:t>
+            </a:r>
+          </a:p>
+          <a:p>
+            <a:pPr lvl="0"/>
+            <a:r>
+              <a:rPr>
+                <a:hlinkClick r:id="rId6"/>
+              </a:rPr>
+              <a:t>NIST Dictionary of Algorithms and Data Structures</a:t>
+            </a:r>
+          </a:p>
+          <a:p>
+            <a:pPr lvl="0"/>
+            <a:r>
+              <a:rPr>
+                <a:hlinkClick r:id="rId7"/>
+              </a:rPr>
+              <a:t>NIST - Dictionary of Algorithms and Data Structures</a:t>
+            </a:r>
+          </a:p>
+          <a:p>
+            <a:pPr lvl="0" indent="0" marL="0">
+              <a:buNone/>
+            </a:pPr>
+            <a:r>
+              <a:rPr/>
+              <a:t>TODO</a:t>
             </a:r>
           </a:p>
         </p:txBody>

</xml_diff>